<commit_message>
TOM 13 Fußnote eingearbeitet
</commit_message>
<xml_diff>
--- a/music moves/Tomatoes (TOM)/ger/apprentice/ger_TOM_13_Spiele_mit_der_Zeit_MM_A.pptx
+++ b/music moves/Tomatoes (TOM)/ger/apprentice/ger_TOM_13_Spiele_mit_der_Zeit_MM_A.pptx
@@ -1624,7 +1624,23 @@
             </a:pPr>
             <a:r>
               <a:rPr lang="de-DE" sz="1100" dirty="0"/>
-              <a:t>Eine Tomatenlänge von 25 min ist lediglich ein Vorschlag. Auch andere Tomatenlängen können in verschiedenen Situationen gut funktionieren</a:t>
+              <a:t>Eine </a:t>
+            </a:r>
+            <a:r>
+              <a:rPr lang="de-DE" sz="1100" dirty="0" smtClean="0"/>
+              <a:t>Tomatenlänge</a:t>
+            </a:r>
+            <a:r>
+              <a:rPr lang="de-DE" sz="1100" baseline="30000" dirty="0" smtClean="0"/>
+              <a:t>1</a:t>
+            </a:r>
+            <a:r>
+              <a:rPr lang="de-DE" sz="1100" dirty="0" smtClean="0"/>
+              <a:t> </a:t>
+            </a:r>
+            <a:r>
+              <a:rPr lang="de-DE" sz="1100" dirty="0"/>
+              <a:t>von 25 min ist lediglich ein Vorschlag. Auch andere Tomatenlängen können in verschiedenen Situationen gut funktionieren</a:t>
             </a:r>
             <a:r>
               <a:rPr lang="de-DE" sz="1100" dirty="0" smtClean="0"/>
@@ -1762,6 +1778,161 @@
               <a:t>45 min Tomate</a:t>
             </a:r>
             <a:endParaRPr lang="de-DE" dirty="0"/>
+          </a:p>
+        </p:txBody>
+      </p:sp>
+      <p:sp>
+        <p:nvSpPr>
+          <p:cNvPr id="5" name="Fußzeilenplatzhalter 19"/>
+          <p:cNvSpPr txBox="1">
+            <a:spLocks/>
+          </p:cNvSpPr>
+          <p:nvPr/>
+        </p:nvSpPr>
+        <p:spPr>
+          <a:xfrm>
+            <a:off x="5086569" y="4776480"/>
+            <a:ext cx="1775894" cy="283817"/>
+          </a:xfrm>
+          <a:prstGeom prst="rect">
+            <a:avLst/>
+          </a:prstGeom>
+        </p:spPr>
+        <p:txBody>
+          <a:bodyPr/>
+          <a:lstStyle>
+            <a:defPPr>
+              <a:defRPr lang="de-DE"/>
+            </a:defPPr>
+            <a:lvl1pPr marL="0" algn="l" defTabSz="403388" rtl="0" eaLnBrk="1" latinLnBrk="0" hangingPunct="1">
+              <a:defRPr sz="1600" kern="1200">
+                <a:solidFill>
+                  <a:schemeClr val="tx1"/>
+                </a:solidFill>
+                <a:latin typeface="+mn-lt"/>
+                <a:ea typeface="+mn-ea"/>
+                <a:cs typeface="+mn-cs"/>
+              </a:defRPr>
+            </a:lvl1pPr>
+            <a:lvl2pPr marL="403388" algn="l" defTabSz="403388" rtl="0" eaLnBrk="1" latinLnBrk="0" hangingPunct="1">
+              <a:defRPr sz="1600" kern="1200">
+                <a:solidFill>
+                  <a:schemeClr val="tx1"/>
+                </a:solidFill>
+                <a:latin typeface="+mn-lt"/>
+                <a:ea typeface="+mn-ea"/>
+                <a:cs typeface="+mn-cs"/>
+              </a:defRPr>
+            </a:lvl2pPr>
+            <a:lvl3pPr marL="806775" algn="l" defTabSz="403388" rtl="0" eaLnBrk="1" latinLnBrk="0" hangingPunct="1">
+              <a:defRPr sz="1600" kern="1200">
+                <a:solidFill>
+                  <a:schemeClr val="tx1"/>
+                </a:solidFill>
+                <a:latin typeface="+mn-lt"/>
+                <a:ea typeface="+mn-ea"/>
+                <a:cs typeface="+mn-cs"/>
+              </a:defRPr>
+            </a:lvl3pPr>
+            <a:lvl4pPr marL="1210163" algn="l" defTabSz="403388" rtl="0" eaLnBrk="1" latinLnBrk="0" hangingPunct="1">
+              <a:defRPr sz="1600" kern="1200">
+                <a:solidFill>
+                  <a:schemeClr val="tx1"/>
+                </a:solidFill>
+                <a:latin typeface="+mn-lt"/>
+                <a:ea typeface="+mn-ea"/>
+                <a:cs typeface="+mn-cs"/>
+              </a:defRPr>
+            </a:lvl4pPr>
+            <a:lvl5pPr marL="1613550" algn="l" defTabSz="403388" rtl="0" eaLnBrk="1" latinLnBrk="0" hangingPunct="1">
+              <a:defRPr sz="1600" kern="1200">
+                <a:solidFill>
+                  <a:schemeClr val="tx1"/>
+                </a:solidFill>
+                <a:latin typeface="+mn-lt"/>
+                <a:ea typeface="+mn-ea"/>
+                <a:cs typeface="+mn-cs"/>
+              </a:defRPr>
+            </a:lvl5pPr>
+            <a:lvl6pPr marL="2016938" algn="l" defTabSz="403388" rtl="0" eaLnBrk="1" latinLnBrk="0" hangingPunct="1">
+              <a:defRPr sz="1600" kern="1200">
+                <a:solidFill>
+                  <a:schemeClr val="tx1"/>
+                </a:solidFill>
+                <a:latin typeface="+mn-lt"/>
+                <a:ea typeface="+mn-ea"/>
+                <a:cs typeface="+mn-cs"/>
+              </a:defRPr>
+            </a:lvl6pPr>
+            <a:lvl7pPr marL="2420325" algn="l" defTabSz="403388" rtl="0" eaLnBrk="1" latinLnBrk="0" hangingPunct="1">
+              <a:defRPr sz="1600" kern="1200">
+                <a:solidFill>
+                  <a:schemeClr val="tx1"/>
+                </a:solidFill>
+                <a:latin typeface="+mn-lt"/>
+                <a:ea typeface="+mn-ea"/>
+                <a:cs typeface="+mn-cs"/>
+              </a:defRPr>
+            </a:lvl7pPr>
+            <a:lvl8pPr marL="2823713" algn="l" defTabSz="403388" rtl="0" eaLnBrk="1" latinLnBrk="0" hangingPunct="1">
+              <a:defRPr sz="1600" kern="1200">
+                <a:solidFill>
+                  <a:schemeClr val="tx1"/>
+                </a:solidFill>
+                <a:latin typeface="+mn-lt"/>
+                <a:ea typeface="+mn-ea"/>
+                <a:cs typeface="+mn-cs"/>
+              </a:defRPr>
+            </a:lvl8pPr>
+            <a:lvl9pPr marL="3227100" algn="l" defTabSz="403388" rtl="0" eaLnBrk="1" latinLnBrk="0" hangingPunct="1">
+              <a:defRPr sz="1600" kern="1200">
+                <a:solidFill>
+                  <a:schemeClr val="tx1"/>
+                </a:solidFill>
+                <a:latin typeface="+mn-lt"/>
+                <a:ea typeface="+mn-ea"/>
+                <a:cs typeface="+mn-cs"/>
+              </a:defRPr>
+            </a:lvl9pPr>
+          </a:lstStyle>
+          <a:p>
+            <a:r>
+              <a:rPr lang="de-DE" sz="900" baseline="30000" dirty="0" smtClean="0">
+                <a:solidFill>
+                  <a:schemeClr val="bg1">
+                    <a:lumMod val="65000"/>
+                  </a:schemeClr>
+                </a:solidFill>
+              </a:rPr>
+              <a:t>1</a:t>
+            </a:r>
+            <a:r>
+              <a:rPr lang="de-DE" sz="900" dirty="0" smtClean="0">
+                <a:solidFill>
+                  <a:schemeClr val="bg1">
+                    <a:lumMod val="65000"/>
+                  </a:schemeClr>
+                </a:solidFill>
+              </a:rPr>
+              <a:t>  </a:t>
+            </a:r>
+            <a:r>
+              <a:rPr lang="de-DE" sz="900" dirty="0" err="1" smtClean="0">
+                <a:solidFill>
+                  <a:schemeClr val="bg1">
+                    <a:lumMod val="65000"/>
+                  </a:schemeClr>
+                </a:solidFill>
+              </a:rPr>
+              <a:t>www.pomodorotechnique.com</a:t>
+            </a:r>
+            <a:endParaRPr lang="de-DE" sz="900" dirty="0">
+              <a:solidFill>
+                <a:schemeClr val="bg1">
+                  <a:lumMod val="65000"/>
+                </a:schemeClr>
+              </a:solidFill>
+            </a:endParaRPr>
           </a:p>
         </p:txBody>
       </p:sp>
@@ -1834,26 +2005,18 @@
           <a:p>
             <a:r>
               <a:rPr lang="de-DE" sz="1100" dirty="0"/>
-              <a:t>Mache in einer </a:t>
-            </a:r>
-            <a:r>
-              <a:rPr lang="de-DE" sz="1100"/>
-              <a:t>Phase </a:t>
-            </a:r>
-            <a:r>
-              <a:rPr lang="de-DE" sz="1100" smtClean="0"/>
+              <a:t>Mache in einer Phase </a:t>
+            </a:r>
+            <a:r>
+              <a:rPr lang="de-DE" sz="1100" dirty="0" smtClean="0"/>
               <a:t>mindestens</a:t>
             </a:r>
             <a:r>
               <a:rPr lang="de-DE" sz="1100" dirty="0"/>
-              <a:t> 3 Tomaten mit gleicher Länge, also insgesamt 9 </a:t>
-            </a:r>
-            <a:r>
-              <a:rPr lang="de-DE" sz="1100"/>
-              <a:t>Tomaten</a:t>
-            </a:r>
-            <a:r>
-              <a:rPr lang="de-DE" sz="1100" smtClean="0"/>
+              <a:t> 3 Tomaten mit gleicher Länge, also insgesamt 9 Tomaten</a:t>
+            </a:r>
+            <a:r>
+              <a:rPr lang="de-DE" sz="1100" dirty="0" smtClean="0"/>
               <a:t>.</a:t>
             </a:r>
           </a:p>

</xml_diff>